<commit_message>
updates and new ppts
</commit_message>
<xml_diff>
--- a/CoreJava.pptx
+++ b/CoreJava.pptx
@@ -322,7 +322,7 @@
           <a:p>
             <a:fld id="{8F235549-BF0A-4B98-8561-3786244E808C}" type="datetimeFigureOut">
               <a:rPr lang="en-US" smtClean="0"/>
-              <a:t>4/1/2016</a:t>
+              <a:t>4/4/2016</a:t>
             </a:fld>
             <a:endParaRPr lang="en-US"/>
           </a:p>
@@ -522,7 +522,7 @@
           <a:p>
             <a:fld id="{8F235549-BF0A-4B98-8561-3786244E808C}" type="datetimeFigureOut">
               <a:rPr lang="en-US" smtClean="0"/>
-              <a:t>4/1/2016</a:t>
+              <a:t>4/4/2016</a:t>
             </a:fld>
             <a:endParaRPr lang="en-US"/>
           </a:p>
@@ -697,7 +697,7 @@
           <a:p>
             <a:fld id="{8F235549-BF0A-4B98-8561-3786244E808C}" type="datetimeFigureOut">
               <a:rPr lang="en-US" smtClean="0"/>
-              <a:t>4/1/2016</a:t>
+              <a:t>4/4/2016</a:t>
             </a:fld>
             <a:endParaRPr lang="en-US"/>
           </a:p>
@@ -862,7 +862,7 @@
           <a:p>
             <a:fld id="{8F235549-BF0A-4B98-8561-3786244E808C}" type="datetimeFigureOut">
               <a:rPr lang="en-US" smtClean="0"/>
-              <a:t>4/1/2016</a:t>
+              <a:t>4/4/2016</a:t>
             </a:fld>
             <a:endParaRPr lang="en-US"/>
           </a:p>
@@ -1110,7 +1110,7 @@
           <a:p>
             <a:fld id="{8F235549-BF0A-4B98-8561-3786244E808C}" type="datetimeFigureOut">
               <a:rPr lang="en-US" smtClean="0"/>
-              <a:t>4/1/2016</a:t>
+              <a:t>4/4/2016</a:t>
             </a:fld>
             <a:endParaRPr lang="en-US"/>
           </a:p>
@@ -1428,7 +1428,7 @@
           <a:p>
             <a:fld id="{8F235549-BF0A-4B98-8561-3786244E808C}" type="datetimeFigureOut">
               <a:rPr lang="en-US" smtClean="0"/>
-              <a:t>4/1/2016</a:t>
+              <a:t>4/4/2016</a:t>
             </a:fld>
             <a:endParaRPr lang="en-US"/>
           </a:p>
@@ -1894,7 +1894,7 @@
           <a:p>
             <a:fld id="{8F235549-BF0A-4B98-8561-3786244E808C}" type="datetimeFigureOut">
               <a:rPr lang="en-US" smtClean="0"/>
-              <a:t>4/1/2016</a:t>
+              <a:t>4/4/2016</a:t>
             </a:fld>
             <a:endParaRPr lang="en-US"/>
           </a:p>
@@ -2042,7 +2042,7 @@
           <a:p>
             <a:fld id="{8F235549-BF0A-4B98-8561-3786244E808C}" type="datetimeFigureOut">
               <a:rPr lang="en-US" smtClean="0"/>
-              <a:t>4/1/2016</a:t>
+              <a:t>4/4/2016</a:t>
             </a:fld>
             <a:endParaRPr lang="en-US"/>
           </a:p>
@@ -2132,7 +2132,7 @@
           <a:p>
             <a:fld id="{8F235549-BF0A-4B98-8561-3786244E808C}" type="datetimeFigureOut">
               <a:rPr lang="en-US" smtClean="0"/>
-              <a:t>4/1/2016</a:t>
+              <a:t>4/4/2016</a:t>
             </a:fld>
             <a:endParaRPr lang="en-US"/>
           </a:p>
@@ -2406,7 +2406,7 @@
           <a:p>
             <a:fld id="{8F235549-BF0A-4B98-8561-3786244E808C}" type="datetimeFigureOut">
               <a:rPr lang="en-US" smtClean="0"/>
-              <a:t>4/1/2016</a:t>
+              <a:t>4/4/2016</a:t>
             </a:fld>
             <a:endParaRPr lang="en-US"/>
           </a:p>
@@ -2711,7 +2711,7 @@
           <a:p>
             <a:fld id="{8F235549-BF0A-4B98-8561-3786244E808C}" type="datetimeFigureOut">
               <a:rPr lang="en-US" smtClean="0"/>
-              <a:t>4/1/2016</a:t>
+              <a:t>4/4/2016</a:t>
             </a:fld>
             <a:endParaRPr lang="en-US"/>
           </a:p>
@@ -3009,7 +3009,7 @@
           <a:p>
             <a:fld id="{8F235549-BF0A-4B98-8561-3786244E808C}" type="datetimeFigureOut">
               <a:rPr lang="en-US" smtClean="0"/>
-              <a:t>4/1/2016</a:t>
+              <a:t>4/4/2016</a:t>
             </a:fld>
             <a:endParaRPr lang="en-US"/>
           </a:p>
@@ -13878,8 +13878,23 @@
           </a:p>
           <a:p>
             <a:r>
+              <a:rPr lang="en-US" sz="1600" dirty="0">
+                <a:hlinkClick r:id="rId10"/>
+              </a:rPr>
+              <a:t>http://crunchify.com/better-understanding-on-checked-vs-unchecked-exceptions-how-to-handle-exception-better-way-in-java</a:t>
+            </a:r>
+            <a:r>
+              <a:rPr lang="en-US" sz="1600" dirty="0" smtClean="0">
+                <a:hlinkClick r:id="rId10"/>
+              </a:rPr>
+              <a:t>/</a:t>
+            </a:r>
+            <a:endParaRPr lang="en-US" sz="1600" dirty="0" smtClean="0"/>
+          </a:p>
+          <a:p>
+            <a:r>
               <a:rPr lang="en-US" sz="1600" dirty="0"/>
-              <a:t>http://crunchify.com/better-understanding-on-checked-vs-unchecked-exceptions-how-to-handle-exception-better-way-in-java/</a:t>
+              <a:t>http://misko.hevery.com/code-reviewers-guide/</a:t>
             </a:r>
             <a:endParaRPr lang="en-US" sz="1600" dirty="0" smtClean="0"/>
           </a:p>

</xml_diff>

<commit_message>
Ways to avoid if/else or switch case
</commit_message>
<xml_diff>
--- a/CoreJava.pptx
+++ b/CoreJava.pptx
@@ -37,10 +37,12 @@
     <p:sldId id="331" r:id="rId31"/>
     <p:sldId id="332" r:id="rId32"/>
     <p:sldId id="323" r:id="rId33"/>
-    <p:sldId id="320" r:id="rId34"/>
-    <p:sldId id="321" r:id="rId35"/>
-    <p:sldId id="322" r:id="rId36"/>
-    <p:sldId id="269" r:id="rId37"/>
+    <p:sldId id="334" r:id="rId34"/>
+    <p:sldId id="333" r:id="rId35"/>
+    <p:sldId id="320" r:id="rId36"/>
+    <p:sldId id="321" r:id="rId37"/>
+    <p:sldId id="322" r:id="rId38"/>
+    <p:sldId id="269" r:id="rId39"/>
   </p:sldIdLst>
   <p:sldSz cx="9144000" cy="6858000" type="screen4x3"/>
   <p:notesSz cx="6858000" cy="9144000"/>
@@ -330,7 +332,7 @@
           <a:p>
             <a:fld id="{8F235549-BF0A-4B98-8561-3786244E808C}" type="datetimeFigureOut">
               <a:rPr lang="en-US" smtClean="0"/>
-              <a:t>3/7/2018</a:t>
+              <a:t>3/20/2018</a:t>
             </a:fld>
             <a:endParaRPr lang="en-US"/>
           </a:p>
@@ -530,7 +532,7 @@
           <a:p>
             <a:fld id="{8F235549-BF0A-4B98-8561-3786244E808C}" type="datetimeFigureOut">
               <a:rPr lang="en-US" smtClean="0"/>
-              <a:t>3/7/2018</a:t>
+              <a:t>3/20/2018</a:t>
             </a:fld>
             <a:endParaRPr lang="en-US"/>
           </a:p>
@@ -705,7 +707,7 @@
           <a:p>
             <a:fld id="{8F235549-BF0A-4B98-8561-3786244E808C}" type="datetimeFigureOut">
               <a:rPr lang="en-US" smtClean="0"/>
-              <a:t>3/7/2018</a:t>
+              <a:t>3/20/2018</a:t>
             </a:fld>
             <a:endParaRPr lang="en-US"/>
           </a:p>
@@ -870,7 +872,7 @@
           <a:p>
             <a:fld id="{8F235549-BF0A-4B98-8561-3786244E808C}" type="datetimeFigureOut">
               <a:rPr lang="en-US" smtClean="0"/>
-              <a:t>3/7/2018</a:t>
+              <a:t>3/20/2018</a:t>
             </a:fld>
             <a:endParaRPr lang="en-US"/>
           </a:p>
@@ -1118,7 +1120,7 @@
           <a:p>
             <a:fld id="{8F235549-BF0A-4B98-8561-3786244E808C}" type="datetimeFigureOut">
               <a:rPr lang="en-US" smtClean="0"/>
-              <a:t>3/7/2018</a:t>
+              <a:t>3/20/2018</a:t>
             </a:fld>
             <a:endParaRPr lang="en-US"/>
           </a:p>
@@ -1436,7 +1438,7 @@
           <a:p>
             <a:fld id="{8F235549-BF0A-4B98-8561-3786244E808C}" type="datetimeFigureOut">
               <a:rPr lang="en-US" smtClean="0"/>
-              <a:t>3/7/2018</a:t>
+              <a:t>3/20/2018</a:t>
             </a:fld>
             <a:endParaRPr lang="en-US"/>
           </a:p>
@@ -1902,7 +1904,7 @@
           <a:p>
             <a:fld id="{8F235549-BF0A-4B98-8561-3786244E808C}" type="datetimeFigureOut">
               <a:rPr lang="en-US" smtClean="0"/>
-              <a:t>3/7/2018</a:t>
+              <a:t>3/20/2018</a:t>
             </a:fld>
             <a:endParaRPr lang="en-US"/>
           </a:p>
@@ -2050,7 +2052,7 @@
           <a:p>
             <a:fld id="{8F235549-BF0A-4B98-8561-3786244E808C}" type="datetimeFigureOut">
               <a:rPr lang="en-US" smtClean="0"/>
-              <a:t>3/7/2018</a:t>
+              <a:t>3/20/2018</a:t>
             </a:fld>
             <a:endParaRPr lang="en-US"/>
           </a:p>
@@ -2140,7 +2142,7 @@
           <a:p>
             <a:fld id="{8F235549-BF0A-4B98-8561-3786244E808C}" type="datetimeFigureOut">
               <a:rPr lang="en-US" smtClean="0"/>
-              <a:t>3/7/2018</a:t>
+              <a:t>3/20/2018</a:t>
             </a:fld>
             <a:endParaRPr lang="en-US"/>
           </a:p>
@@ -2414,7 +2416,7 @@
           <a:p>
             <a:fld id="{8F235549-BF0A-4B98-8561-3786244E808C}" type="datetimeFigureOut">
               <a:rPr lang="en-US" smtClean="0"/>
-              <a:t>3/7/2018</a:t>
+              <a:t>3/20/2018</a:t>
             </a:fld>
             <a:endParaRPr lang="en-US"/>
           </a:p>
@@ -2719,7 +2721,7 @@
           <a:p>
             <a:fld id="{8F235549-BF0A-4B98-8561-3786244E808C}" type="datetimeFigureOut">
               <a:rPr lang="en-US" smtClean="0"/>
-              <a:t>3/7/2018</a:t>
+              <a:t>3/20/2018</a:t>
             </a:fld>
             <a:endParaRPr lang="en-US"/>
           </a:p>
@@ -3017,7 +3019,7 @@
           <a:p>
             <a:fld id="{8F235549-BF0A-4B98-8561-3786244E808C}" type="datetimeFigureOut">
               <a:rPr lang="en-US" smtClean="0"/>
-              <a:t>3/7/2018</a:t>
+              <a:t>3/20/2018</a:t>
             </a:fld>
             <a:endParaRPr lang="en-US"/>
           </a:p>
@@ -13140,13 +13142,13 @@
         <p:spPr/>
         <p:txBody>
           <a:bodyPr>
-            <a:normAutofit/>
+            <a:normAutofit fontScale="90000"/>
           </a:bodyPr>
           <a:lstStyle/>
           <a:p>
             <a:r>
               <a:rPr lang="en-US" dirty="0" smtClean="0"/>
-              <a:t>Code Review – Main</a:t>
+              <a:t>Ways to avoid IF-ELSE or SWITCH case</a:t>
             </a:r>
             <a:endParaRPr lang="en-US" dirty="0"/>
           </a:p>
@@ -13316,66 +13318,81 @@
           <a:p>
             <a:r>
               <a:rPr lang="en-US" sz="1600" dirty="0" smtClean="0"/>
-              <a:t>Does code meet functional requirement</a:t>
+              <a:t>Reflection – caller has to remember the fully qualified name</a:t>
             </a:r>
           </a:p>
           <a:p>
             <a:r>
               <a:rPr lang="en-US" sz="1600" dirty="0" smtClean="0"/>
-              <a:t>Any side effect of this change</a:t>
-            </a:r>
-          </a:p>
-          <a:p>
-            <a:r>
-              <a:rPr lang="en-US" sz="1600" dirty="0" smtClean="0"/>
-              <a:t>Concurrency – Is thread safe?</a:t>
-            </a:r>
-          </a:p>
-          <a:p>
-            <a:r>
-              <a:rPr lang="en-US" sz="1600" dirty="0" smtClean="0"/>
-              <a:t>Readability and Maintenance </a:t>
-            </a:r>
-          </a:p>
-          <a:p>
-            <a:r>
-              <a:rPr lang="en-US" sz="1600" dirty="0" smtClean="0"/>
-              <a:t>Consistency</a:t>
-            </a:r>
-          </a:p>
-          <a:p>
-            <a:r>
-              <a:rPr lang="en-US" sz="1600" dirty="0" smtClean="0"/>
-              <a:t>Performance</a:t>
-            </a:r>
-          </a:p>
-          <a:p>
-            <a:r>
-              <a:rPr lang="en-US" sz="1600" dirty="0" smtClean="0"/>
-              <a:t>Exception Handling</a:t>
-            </a:r>
-          </a:p>
-          <a:p>
-            <a:r>
-              <a:rPr lang="en-US" sz="1600" dirty="0" smtClean="0"/>
-              <a:t>Simplicity</a:t>
-            </a:r>
-          </a:p>
-          <a:p>
-            <a:r>
-              <a:rPr lang="en-US" sz="1600" dirty="0" smtClean="0"/>
-              <a:t>Reuse of existing code</a:t>
-            </a:r>
-          </a:p>
-          <a:p>
-            <a:r>
-              <a:rPr lang="en-US" sz="1600" dirty="0" smtClean="0"/>
-              <a:t>Unit test </a:t>
-            </a:r>
-            <a:endParaRPr lang="en-US" sz="1600" dirty="0"/>
+              <a:t>Map</a:t>
+            </a:r>
+          </a:p>
+          <a:p>
+            <a:r>
+              <a:rPr lang="en-US" sz="1600" dirty="0" err="1" smtClean="0"/>
+              <a:t>Enum</a:t>
+            </a:r>
+            <a:endParaRPr lang="en-US" sz="1600" dirty="0" smtClean="0"/>
+          </a:p>
+          <a:p>
+            <a:endParaRPr lang="en-US" sz="1600" dirty="0" smtClean="0"/>
           </a:p>
         </p:txBody>
       </p:sp>
+      <p:pic>
+        <p:nvPicPr>
+          <p:cNvPr id="1026" name="Picture 2"/>
+          <p:cNvPicPr>
+            <a:picLocks noChangeAspect="1" noChangeArrowheads="1"/>
+          </p:cNvPicPr>
+          <p:nvPr/>
+        </p:nvPicPr>
+        <p:blipFill>
+          <a:blip r:embed="rId2">
+            <a:extLst>
+              <a:ext uri="{28A0092B-C50C-407E-A947-70E740481C1C}">
+                <a14:useLocalDpi xmlns:a14="http://schemas.microsoft.com/office/drawing/2010/main" val="0"/>
+              </a:ext>
+            </a:extLst>
+          </a:blip>
+          <a:srcRect/>
+          <a:stretch>
+            <a:fillRect/>
+          </a:stretch>
+        </p:blipFill>
+        <p:spPr bwMode="auto">
+          <a:xfrm>
+            <a:off x="755577" y="2708920"/>
+            <a:ext cx="4608512" cy="3487638"/>
+          </a:xfrm>
+          <a:prstGeom prst="rect">
+            <a:avLst/>
+          </a:prstGeom>
+          <a:noFill/>
+          <a:ln>
+            <a:noFill/>
+          </a:ln>
+          <a:extLst>
+            <a:ext uri="{909E8E84-426E-40DD-AFC4-6F175D3DCCD1}">
+              <a14:hiddenFill xmlns:a14="http://schemas.microsoft.com/office/drawing/2010/main">
+                <a:solidFill>
+                  <a:schemeClr val="accent1"/>
+                </a:solidFill>
+              </a14:hiddenFill>
+            </a:ext>
+            <a:ext uri="{91240B29-F687-4F45-9708-019B960494DF}">
+              <a14:hiddenLine xmlns:a14="http://schemas.microsoft.com/office/drawing/2010/main" w="9525">
+                <a:solidFill>
+                  <a:schemeClr val="tx1"/>
+                </a:solidFill>
+                <a:miter lim="800000"/>
+                <a:headEnd/>
+                <a:tailEnd/>
+              </a14:hiddenLine>
+            </a:ext>
+          </a:extLst>
+        </p:spPr>
+      </p:pic>
     </p:spTree>
     <p:extLst>
       <p:ext uri="{BB962C8B-B14F-4D97-AF65-F5344CB8AC3E}">
@@ -13397,6 +13414,592 @@
 </file>
 
 <file path=ppt/slides/slide33.xml><?xml version="1.0" encoding="utf-8"?>
+<p:sld xmlns:a="http://schemas.openxmlformats.org/drawingml/2006/main" xmlns:r="http://schemas.openxmlformats.org/officeDocument/2006/relationships" xmlns:p="http://schemas.openxmlformats.org/presentationml/2006/main">
+  <p:cSld>
+    <p:bg>
+      <p:bgPr>
+        <a:noFill/>
+        <a:effectLst/>
+      </p:bgPr>
+    </p:bg>
+    <p:spTree>
+      <p:nvGrpSpPr>
+        <p:cNvPr id="1" name=""/>
+        <p:cNvGrpSpPr/>
+        <p:nvPr/>
+      </p:nvGrpSpPr>
+      <p:grpSpPr>
+        <a:xfrm>
+          <a:off x="0" y="0"/>
+          <a:ext cx="0" cy="0"/>
+          <a:chOff x="0" y="0"/>
+          <a:chExt cx="0" cy="0"/>
+        </a:xfrm>
+      </p:grpSpPr>
+      <p:sp>
+        <p:nvSpPr>
+          <p:cNvPr id="2" name="Title 1"/>
+          <p:cNvSpPr>
+            <a:spLocks noGrp="1"/>
+          </p:cNvSpPr>
+          <p:nvPr>
+            <p:ph type="title"/>
+          </p:nvPr>
+        </p:nvSpPr>
+        <p:spPr/>
+        <p:txBody>
+          <a:bodyPr>
+            <a:normAutofit fontScale="90000"/>
+          </a:bodyPr>
+          <a:lstStyle/>
+          <a:p>
+            <a:r>
+              <a:rPr lang="en-US" dirty="0" smtClean="0"/>
+              <a:t>Ways to avoid IF-ELSE or SWITCH case</a:t>
+            </a:r>
+            <a:endParaRPr lang="en-US" dirty="0"/>
+          </a:p>
+        </p:txBody>
+      </p:sp>
+      <p:sp>
+        <p:nvSpPr>
+          <p:cNvPr id="5" name="Rectangle 1"/>
+          <p:cNvSpPr>
+            <a:spLocks noChangeArrowheads="1"/>
+          </p:cNvSpPr>
+          <p:nvPr/>
+        </p:nvSpPr>
+        <p:spPr bwMode="auto">
+          <a:xfrm>
+            <a:off x="457200" y="2530475"/>
+            <a:ext cx="9144000" cy="0"/>
+          </a:xfrm>
+          <a:prstGeom prst="rect">
+            <a:avLst/>
+          </a:prstGeom>
+          <a:noFill/>
+          <a:ln>
+            <a:noFill/>
+          </a:ln>
+          <a:effectLst/>
+          <a:extLst>
+            <a:ext uri="{909E8E84-426E-40DD-AFC4-6F175D3DCCD1}">
+              <a14:hiddenFill xmlns:a14="http://schemas.microsoft.com/office/drawing/2010/main">
+                <a:solidFill>
+                  <a:schemeClr val="accent1"/>
+                </a:solidFill>
+              </a14:hiddenFill>
+            </a:ext>
+            <a:ext uri="{91240B29-F687-4F45-9708-019B960494DF}">
+              <a14:hiddenLine xmlns:a14="http://schemas.microsoft.com/office/drawing/2010/main" w="9525">
+                <a:solidFill>
+                  <a:schemeClr val="tx1"/>
+                </a:solidFill>
+                <a:miter lim="800000"/>
+                <a:headEnd/>
+                <a:tailEnd/>
+              </a14:hiddenLine>
+            </a:ext>
+            <a:ext uri="{AF507438-7753-43E0-B8FC-AC1667EBCBE1}">
+              <a14:hiddenEffects xmlns:a14="http://schemas.microsoft.com/office/drawing/2010/main">
+                <a:effectLst>
+                  <a:outerShdw dist="35921" dir="2700000" algn="ctr" rotWithShape="0">
+                    <a:schemeClr val="bg2"/>
+                  </a:outerShdw>
+                </a:effectLst>
+              </a14:hiddenEffects>
+            </a:ext>
+          </a:extLst>
+        </p:spPr>
+        <p:txBody>
+          <a:bodyPr vert="horz" wrap="none" lIns="91440" tIns="45720" rIns="91440" bIns="45720" numCol="1" anchor="ctr" anchorCtr="0" compatLnSpc="1">
+            <a:prstTxWarp prst="textNoShape">
+              <a:avLst/>
+            </a:prstTxWarp>
+            <a:spAutoFit/>
+          </a:bodyPr>
+          <a:lstStyle/>
+          <a:p>
+            <a:pPr marL="0" marR="0" lvl="0" indent="0" algn="l" defTabSz="914400" rtl="0" eaLnBrk="1" fontAlgn="base" latinLnBrk="0" hangingPunct="1">
+              <a:lnSpc>
+                <a:spcPct val="100000"/>
+              </a:lnSpc>
+              <a:spcBef>
+                <a:spcPct val="0"/>
+              </a:spcBef>
+              <a:spcAft>
+                <a:spcPct val="0"/>
+              </a:spcAft>
+              <a:buClrTx/>
+              <a:buSzTx/>
+              <a:buFontTx/>
+              <a:buNone/>
+              <a:tabLst/>
+            </a:pPr>
+            <a:endParaRPr kumimoji="0" lang="en-US" altLang="en-US" sz="1800" b="0" i="0" u="none" strike="noStrike" cap="none" normalizeH="0" baseline="0" smtClean="0">
+              <a:ln>
+                <a:noFill/>
+              </a:ln>
+              <a:solidFill>
+                <a:schemeClr val="tx1"/>
+              </a:solidFill>
+              <a:effectLst/>
+              <a:latin typeface="Arial" pitchFamily="34" charset="0"/>
+              <a:cs typeface="Arial" pitchFamily="34" charset="0"/>
+            </a:endParaRPr>
+          </a:p>
+          <a:p>
+            <a:pPr marL="0" marR="0" lvl="0" indent="0" algn="l" defTabSz="914400" rtl="0" eaLnBrk="0" fontAlgn="base" latinLnBrk="0" hangingPunct="0">
+              <a:lnSpc>
+                <a:spcPct val="100000"/>
+              </a:lnSpc>
+              <a:spcBef>
+                <a:spcPct val="0"/>
+              </a:spcBef>
+              <a:spcAft>
+                <a:spcPct val="0"/>
+              </a:spcAft>
+              <a:buClrTx/>
+              <a:buSzTx/>
+              <a:buFontTx/>
+              <a:buNone/>
+              <a:tabLst/>
+            </a:pPr>
+            <a:r>
+              <a:rPr kumimoji="0" lang="en-US" altLang="en-US" sz="1800" b="0" i="0" u="none" strike="noStrike" cap="none" normalizeH="0" baseline="0" smtClean="0">
+                <a:ln>
+                  <a:noFill/>
+                </a:ln>
+                <a:solidFill>
+                  <a:schemeClr val="tx1"/>
+                </a:solidFill>
+                <a:effectLst/>
+                <a:latin typeface="Arial" pitchFamily="34" charset="0"/>
+                <a:cs typeface="Arial" pitchFamily="34" charset="0"/>
+              </a:rPr>
+              <a:t/>
+            </a:r>
+            <a:br>
+              <a:rPr kumimoji="0" lang="en-US" altLang="en-US" sz="1800" b="0" i="0" u="none" strike="noStrike" cap="none" normalizeH="0" baseline="0" smtClean="0">
+                <a:ln>
+                  <a:noFill/>
+                </a:ln>
+                <a:solidFill>
+                  <a:schemeClr val="tx1"/>
+                </a:solidFill>
+                <a:effectLst/>
+                <a:latin typeface="Arial" pitchFamily="34" charset="0"/>
+                <a:cs typeface="Arial" pitchFamily="34" charset="0"/>
+              </a:rPr>
+            </a:br>
+            <a:endParaRPr kumimoji="0" lang="en-US" altLang="en-US" sz="1800" b="0" i="0" u="none" strike="noStrike" cap="none" normalizeH="0" baseline="0" smtClean="0">
+              <a:ln>
+                <a:noFill/>
+              </a:ln>
+              <a:solidFill>
+                <a:schemeClr val="tx1"/>
+              </a:solidFill>
+              <a:effectLst/>
+              <a:latin typeface="Arial" pitchFamily="34" charset="0"/>
+              <a:cs typeface="Arial" pitchFamily="34" charset="0"/>
+            </a:endParaRPr>
+          </a:p>
+        </p:txBody>
+      </p:sp>
+      <p:sp>
+        <p:nvSpPr>
+          <p:cNvPr id="3" name="Content Placeholder 2"/>
+          <p:cNvSpPr>
+            <a:spLocks noGrp="1"/>
+          </p:cNvSpPr>
+          <p:nvPr>
+            <p:ph idx="1"/>
+          </p:nvPr>
+        </p:nvSpPr>
+        <p:spPr/>
+        <p:txBody>
+          <a:bodyPr>
+            <a:normAutofit/>
+          </a:bodyPr>
+          <a:lstStyle/>
+          <a:p>
+            <a:r>
+              <a:rPr lang="en-US" sz="1600" dirty="0" smtClean="0"/>
+              <a:t>Map</a:t>
+            </a:r>
+          </a:p>
+          <a:p>
+            <a:endParaRPr lang="en-US" sz="1600" dirty="0" smtClean="0"/>
+          </a:p>
+        </p:txBody>
+      </p:sp>
+      <p:pic>
+        <p:nvPicPr>
+          <p:cNvPr id="2050" name="Picture 2"/>
+          <p:cNvPicPr>
+            <a:picLocks noChangeAspect="1" noChangeArrowheads="1"/>
+          </p:cNvPicPr>
+          <p:nvPr/>
+        </p:nvPicPr>
+        <p:blipFill>
+          <a:blip r:embed="rId2">
+            <a:extLst>
+              <a:ext uri="{28A0092B-C50C-407E-A947-70E740481C1C}">
+                <a14:useLocalDpi xmlns:a14="http://schemas.microsoft.com/office/drawing/2010/main" val="0"/>
+              </a:ext>
+            </a:extLst>
+          </a:blip>
+          <a:srcRect/>
+          <a:stretch>
+            <a:fillRect/>
+          </a:stretch>
+        </p:blipFill>
+        <p:spPr bwMode="auto">
+          <a:xfrm>
+            <a:off x="683568" y="2060848"/>
+            <a:ext cx="6648450" cy="2276475"/>
+          </a:xfrm>
+          <a:prstGeom prst="rect">
+            <a:avLst/>
+          </a:prstGeom>
+          <a:noFill/>
+          <a:ln>
+            <a:noFill/>
+          </a:ln>
+          <a:extLst>
+            <a:ext uri="{909E8E84-426E-40DD-AFC4-6F175D3DCCD1}">
+              <a14:hiddenFill xmlns:a14="http://schemas.microsoft.com/office/drawing/2010/main">
+                <a:solidFill>
+                  <a:schemeClr val="accent1"/>
+                </a:solidFill>
+              </a14:hiddenFill>
+            </a:ext>
+            <a:ext uri="{91240B29-F687-4F45-9708-019B960494DF}">
+              <a14:hiddenLine xmlns:a14="http://schemas.microsoft.com/office/drawing/2010/main" w="9525">
+                <a:solidFill>
+                  <a:schemeClr val="tx1"/>
+                </a:solidFill>
+                <a:miter lim="800000"/>
+                <a:headEnd/>
+                <a:tailEnd/>
+              </a14:hiddenLine>
+            </a:ext>
+          </a:extLst>
+        </p:spPr>
+      </p:pic>
+    </p:spTree>
+    <p:extLst>
+      <p:ext uri="{BB962C8B-B14F-4D97-AF65-F5344CB8AC3E}">
+        <p14:creationId xmlns:p14="http://schemas.microsoft.com/office/powerpoint/2010/main" val="417664101"/>
+      </p:ext>
+    </p:extLst>
+  </p:cSld>
+  <p:clrMapOvr>
+    <a:masterClrMapping/>
+  </p:clrMapOvr>
+  <p:timing>
+    <p:tnLst>
+      <p:par>
+        <p:cTn id="1" dur="indefinite" restart="never" nodeType="tmRoot"/>
+      </p:par>
+    </p:tnLst>
+  </p:timing>
+</p:sld>
+</file>
+
+<file path=ppt/slides/slide34.xml><?xml version="1.0" encoding="utf-8"?>
+<p:sld xmlns:a="http://schemas.openxmlformats.org/drawingml/2006/main" xmlns:r="http://schemas.openxmlformats.org/officeDocument/2006/relationships" xmlns:p="http://schemas.openxmlformats.org/presentationml/2006/main">
+  <p:cSld>
+    <p:bg>
+      <p:bgPr>
+        <a:noFill/>
+        <a:effectLst/>
+      </p:bgPr>
+    </p:bg>
+    <p:spTree>
+      <p:nvGrpSpPr>
+        <p:cNvPr id="1" name=""/>
+        <p:cNvGrpSpPr/>
+        <p:nvPr/>
+      </p:nvGrpSpPr>
+      <p:grpSpPr>
+        <a:xfrm>
+          <a:off x="0" y="0"/>
+          <a:ext cx="0" cy="0"/>
+          <a:chOff x="0" y="0"/>
+          <a:chExt cx="0" cy="0"/>
+        </a:xfrm>
+      </p:grpSpPr>
+      <p:sp>
+        <p:nvSpPr>
+          <p:cNvPr id="2" name="Title 1"/>
+          <p:cNvSpPr>
+            <a:spLocks noGrp="1"/>
+          </p:cNvSpPr>
+          <p:nvPr>
+            <p:ph type="title"/>
+          </p:nvPr>
+        </p:nvSpPr>
+        <p:spPr/>
+        <p:txBody>
+          <a:bodyPr>
+            <a:normAutofit/>
+          </a:bodyPr>
+          <a:lstStyle/>
+          <a:p>
+            <a:r>
+              <a:rPr lang="en-US" dirty="0" smtClean="0"/>
+              <a:t>Code Review – Main</a:t>
+            </a:r>
+            <a:endParaRPr lang="en-US" dirty="0"/>
+          </a:p>
+        </p:txBody>
+      </p:sp>
+      <p:sp>
+        <p:nvSpPr>
+          <p:cNvPr id="5" name="Rectangle 1"/>
+          <p:cNvSpPr>
+            <a:spLocks noChangeArrowheads="1"/>
+          </p:cNvSpPr>
+          <p:nvPr/>
+        </p:nvSpPr>
+        <p:spPr bwMode="auto">
+          <a:xfrm>
+            <a:off x="457200" y="2530475"/>
+            <a:ext cx="9144000" cy="0"/>
+          </a:xfrm>
+          <a:prstGeom prst="rect">
+            <a:avLst/>
+          </a:prstGeom>
+          <a:noFill/>
+          <a:ln>
+            <a:noFill/>
+          </a:ln>
+          <a:effectLst/>
+          <a:extLst>
+            <a:ext uri="{909E8E84-426E-40DD-AFC4-6F175D3DCCD1}">
+              <a14:hiddenFill xmlns:a14="http://schemas.microsoft.com/office/drawing/2010/main">
+                <a:solidFill>
+                  <a:schemeClr val="accent1"/>
+                </a:solidFill>
+              </a14:hiddenFill>
+            </a:ext>
+            <a:ext uri="{91240B29-F687-4F45-9708-019B960494DF}">
+              <a14:hiddenLine xmlns:a14="http://schemas.microsoft.com/office/drawing/2010/main" w="9525">
+                <a:solidFill>
+                  <a:schemeClr val="tx1"/>
+                </a:solidFill>
+                <a:miter lim="800000"/>
+                <a:headEnd/>
+                <a:tailEnd/>
+              </a14:hiddenLine>
+            </a:ext>
+            <a:ext uri="{AF507438-7753-43E0-B8FC-AC1667EBCBE1}">
+              <a14:hiddenEffects xmlns:a14="http://schemas.microsoft.com/office/drawing/2010/main">
+                <a:effectLst>
+                  <a:outerShdw dist="35921" dir="2700000" algn="ctr" rotWithShape="0">
+                    <a:schemeClr val="bg2"/>
+                  </a:outerShdw>
+                </a:effectLst>
+              </a14:hiddenEffects>
+            </a:ext>
+          </a:extLst>
+        </p:spPr>
+        <p:txBody>
+          <a:bodyPr vert="horz" wrap="none" lIns="91440" tIns="45720" rIns="91440" bIns="45720" numCol="1" anchor="ctr" anchorCtr="0" compatLnSpc="1">
+            <a:prstTxWarp prst="textNoShape">
+              <a:avLst/>
+            </a:prstTxWarp>
+            <a:spAutoFit/>
+          </a:bodyPr>
+          <a:lstStyle/>
+          <a:p>
+            <a:pPr marL="0" marR="0" lvl="0" indent="0" algn="l" defTabSz="914400" rtl="0" eaLnBrk="1" fontAlgn="base" latinLnBrk="0" hangingPunct="1">
+              <a:lnSpc>
+                <a:spcPct val="100000"/>
+              </a:lnSpc>
+              <a:spcBef>
+                <a:spcPct val="0"/>
+              </a:spcBef>
+              <a:spcAft>
+                <a:spcPct val="0"/>
+              </a:spcAft>
+              <a:buClrTx/>
+              <a:buSzTx/>
+              <a:buFontTx/>
+              <a:buNone/>
+              <a:tabLst/>
+            </a:pPr>
+            <a:endParaRPr kumimoji="0" lang="en-US" altLang="en-US" sz="1800" b="0" i="0" u="none" strike="noStrike" cap="none" normalizeH="0" baseline="0" smtClean="0">
+              <a:ln>
+                <a:noFill/>
+              </a:ln>
+              <a:solidFill>
+                <a:schemeClr val="tx1"/>
+              </a:solidFill>
+              <a:effectLst/>
+              <a:latin typeface="Arial" pitchFamily="34" charset="0"/>
+              <a:cs typeface="Arial" pitchFamily="34" charset="0"/>
+            </a:endParaRPr>
+          </a:p>
+          <a:p>
+            <a:pPr marL="0" marR="0" lvl="0" indent="0" algn="l" defTabSz="914400" rtl="0" eaLnBrk="0" fontAlgn="base" latinLnBrk="0" hangingPunct="0">
+              <a:lnSpc>
+                <a:spcPct val="100000"/>
+              </a:lnSpc>
+              <a:spcBef>
+                <a:spcPct val="0"/>
+              </a:spcBef>
+              <a:spcAft>
+                <a:spcPct val="0"/>
+              </a:spcAft>
+              <a:buClrTx/>
+              <a:buSzTx/>
+              <a:buFontTx/>
+              <a:buNone/>
+              <a:tabLst/>
+            </a:pPr>
+            <a:r>
+              <a:rPr kumimoji="0" lang="en-US" altLang="en-US" sz="1800" b="0" i="0" u="none" strike="noStrike" cap="none" normalizeH="0" baseline="0" smtClean="0">
+                <a:ln>
+                  <a:noFill/>
+                </a:ln>
+                <a:solidFill>
+                  <a:schemeClr val="tx1"/>
+                </a:solidFill>
+                <a:effectLst/>
+                <a:latin typeface="Arial" pitchFamily="34" charset="0"/>
+                <a:cs typeface="Arial" pitchFamily="34" charset="0"/>
+              </a:rPr>
+              <a:t/>
+            </a:r>
+            <a:br>
+              <a:rPr kumimoji="0" lang="en-US" altLang="en-US" sz="1800" b="0" i="0" u="none" strike="noStrike" cap="none" normalizeH="0" baseline="0" smtClean="0">
+                <a:ln>
+                  <a:noFill/>
+                </a:ln>
+                <a:solidFill>
+                  <a:schemeClr val="tx1"/>
+                </a:solidFill>
+                <a:effectLst/>
+                <a:latin typeface="Arial" pitchFamily="34" charset="0"/>
+                <a:cs typeface="Arial" pitchFamily="34" charset="0"/>
+              </a:rPr>
+            </a:br>
+            <a:endParaRPr kumimoji="0" lang="en-US" altLang="en-US" sz="1800" b="0" i="0" u="none" strike="noStrike" cap="none" normalizeH="0" baseline="0" smtClean="0">
+              <a:ln>
+                <a:noFill/>
+              </a:ln>
+              <a:solidFill>
+                <a:schemeClr val="tx1"/>
+              </a:solidFill>
+              <a:effectLst/>
+              <a:latin typeface="Arial" pitchFamily="34" charset="0"/>
+              <a:cs typeface="Arial" pitchFamily="34" charset="0"/>
+            </a:endParaRPr>
+          </a:p>
+        </p:txBody>
+      </p:sp>
+      <p:sp>
+        <p:nvSpPr>
+          <p:cNvPr id="3" name="Content Placeholder 2"/>
+          <p:cNvSpPr>
+            <a:spLocks noGrp="1"/>
+          </p:cNvSpPr>
+          <p:nvPr>
+            <p:ph idx="1"/>
+          </p:nvPr>
+        </p:nvSpPr>
+        <p:spPr/>
+        <p:txBody>
+          <a:bodyPr>
+            <a:normAutofit/>
+          </a:bodyPr>
+          <a:lstStyle/>
+          <a:p>
+            <a:r>
+              <a:rPr lang="en-US" sz="1600" dirty="0" smtClean="0"/>
+              <a:t>Does code meet functional requirement</a:t>
+            </a:r>
+          </a:p>
+          <a:p>
+            <a:r>
+              <a:rPr lang="en-US" sz="1600" dirty="0" smtClean="0"/>
+              <a:t>Any side effect of this change</a:t>
+            </a:r>
+          </a:p>
+          <a:p>
+            <a:r>
+              <a:rPr lang="en-US" sz="1600" dirty="0" smtClean="0"/>
+              <a:t>Concurrency – Is thread safe?</a:t>
+            </a:r>
+          </a:p>
+          <a:p>
+            <a:r>
+              <a:rPr lang="en-US" sz="1600" dirty="0" smtClean="0"/>
+              <a:t>Readability and Maintenance </a:t>
+            </a:r>
+          </a:p>
+          <a:p>
+            <a:r>
+              <a:rPr lang="en-US" sz="1600" dirty="0" smtClean="0"/>
+              <a:t>Consistency</a:t>
+            </a:r>
+          </a:p>
+          <a:p>
+            <a:r>
+              <a:rPr lang="en-US" sz="1600" dirty="0" smtClean="0"/>
+              <a:t>Performance</a:t>
+            </a:r>
+          </a:p>
+          <a:p>
+            <a:r>
+              <a:rPr lang="en-US" sz="1600" dirty="0" smtClean="0"/>
+              <a:t>Exception Handling</a:t>
+            </a:r>
+          </a:p>
+          <a:p>
+            <a:r>
+              <a:rPr lang="en-US" sz="1600" dirty="0" smtClean="0"/>
+              <a:t>Simplicity</a:t>
+            </a:r>
+          </a:p>
+          <a:p>
+            <a:r>
+              <a:rPr lang="en-US" sz="1600" dirty="0" smtClean="0"/>
+              <a:t>Reuse of existing code</a:t>
+            </a:r>
+          </a:p>
+          <a:p>
+            <a:r>
+              <a:rPr lang="en-US" sz="1600" dirty="0" smtClean="0"/>
+              <a:t>Unit test </a:t>
+            </a:r>
+            <a:endParaRPr lang="en-US" sz="1600" dirty="0"/>
+          </a:p>
+        </p:txBody>
+      </p:sp>
+    </p:spTree>
+    <p:extLst>
+      <p:ext uri="{BB962C8B-B14F-4D97-AF65-F5344CB8AC3E}">
+        <p14:creationId xmlns:p14="http://schemas.microsoft.com/office/powerpoint/2010/main" val="3837331011"/>
+      </p:ext>
+    </p:extLst>
+  </p:cSld>
+  <p:clrMapOvr>
+    <a:masterClrMapping/>
+  </p:clrMapOvr>
+  <p:timing>
+    <p:tnLst>
+      <p:par>
+        <p:cTn id="1" dur="indefinite" restart="never" nodeType="tmRoot"/>
+      </p:par>
+    </p:tnLst>
+  </p:timing>
+</p:sld>
+</file>
+
+<file path=ppt/slides/slide35.xml><?xml version="1.0" encoding="utf-8"?>
 <p:sld xmlns:a="http://schemas.openxmlformats.org/drawingml/2006/main" xmlns:r="http://schemas.openxmlformats.org/officeDocument/2006/relationships" xmlns:p="http://schemas.openxmlformats.org/presentationml/2006/main">
   <p:cSld>
     <p:bg>
@@ -13665,7 +14268,7 @@
 </p:sld>
 </file>
 
-<file path=ppt/slides/slide34.xml><?xml version="1.0" encoding="utf-8"?>
+<file path=ppt/slides/slide36.xml><?xml version="1.0" encoding="utf-8"?>
 <p:sld xmlns:a="http://schemas.openxmlformats.org/drawingml/2006/main" xmlns:r="http://schemas.openxmlformats.org/officeDocument/2006/relationships" xmlns:p="http://schemas.openxmlformats.org/presentationml/2006/main">
   <p:cSld>
     <p:bg>
@@ -13934,7 +14537,7 @@
 </p:sld>
 </file>
 
-<file path=ppt/slides/slide35.xml><?xml version="1.0" encoding="utf-8"?>
+<file path=ppt/slides/slide37.xml><?xml version="1.0" encoding="utf-8"?>
 <p:sld xmlns:a="http://schemas.openxmlformats.org/drawingml/2006/main" xmlns:r="http://schemas.openxmlformats.org/officeDocument/2006/relationships" xmlns:p="http://schemas.openxmlformats.org/presentationml/2006/main">
   <p:cSld>
     <p:bg>
@@ -16632,7 +17235,7 @@
 </p:sld>
 </file>
 
-<file path=ppt/slides/slide36.xml><?xml version="1.0" encoding="utf-8"?>
+<file path=ppt/slides/slide38.xml><?xml version="1.0" encoding="utf-8"?>
 <p:sld xmlns:a="http://schemas.openxmlformats.org/drawingml/2006/main" xmlns:r="http://schemas.openxmlformats.org/officeDocument/2006/relationships" xmlns:p="http://schemas.openxmlformats.org/presentationml/2006/main">
   <p:cSld>
     <p:spTree>
@@ -16840,8 +17443,23 @@
           </a:p>
           <a:p>
             <a:r>
+              <a:rPr lang="en-US" sz="1600" dirty="0">
+                <a:hlinkClick r:id="rId12"/>
+              </a:rPr>
+              <a:t>http://</a:t>
+            </a:r>
+            <a:r>
+              <a:rPr lang="en-US" sz="1600" dirty="0" smtClean="0">
+                <a:hlinkClick r:id="rId12"/>
+              </a:rPr>
+              <a:t>www.baeldung.com/java-count-chars</a:t>
+            </a:r>
+            <a:endParaRPr lang="en-US" sz="1600" dirty="0" smtClean="0"/>
+          </a:p>
+          <a:p>
+            <a:r>
               <a:rPr lang="en-US" sz="1600" dirty="0"/>
-              <a:t>http://www.baeldung.com/java-count-chars</a:t>
+              <a:t>https://www.javacodegeeks.com/2014/10/factory-without-if-else.html</a:t>
             </a:r>
             <a:endParaRPr lang="en-US" sz="1600" dirty="0" smtClean="0"/>
           </a:p>

</xml_diff>